<commit_message>
Canvi tamany de lletra (Tasques Principals)
</commit_message>
<xml_diff>
--- a/Documentació/Presentacions/Primera presentació/Primera_presentacio_de_Taam_App.pptx
+++ b/Documentació/Presentacions/Primera presentació/Primera_presentacio_de_Taam_App.pptx
@@ -119,6 +119,22 @@
       </a:defRPr>
     </a:lvl9pPr>
   </p:defaultTextStyle>
+  <p:extLst>
+    <p:ext uri="{EFAFB233-063F-42B5-8137-9DF3F51BA10A}">
+      <p15:sldGuideLst xmlns:p15="http://schemas.microsoft.com/office/powerpoint/2012/main">
+        <p15:guide id="1" orient="horz" pos="2160">
+          <p15:clr>
+            <a:srgbClr val="A4A3A4"/>
+          </p15:clr>
+        </p15:guide>
+        <p15:guide id="2" pos="2880">
+          <p15:clr>
+            <a:srgbClr val="A4A3A4"/>
+          </p15:clr>
+        </p15:guide>
+      </p15:sldGuideLst>
+    </p:ext>
+  </p:extLst>
 </p:presentation>
 </file>
 
@@ -169,7 +185,7 @@
           </a:lstStyle>
           <a:p>
             <a:r>
-              <a:rPr kumimoji="0" lang="es-ES" smtClean="0"/>
+              <a:rPr kumimoji="0" lang="es-ES"/>
               <a:t>Haga clic para modificar el estilo de título del patrón</a:t>
             </a:r>
             <a:endParaRPr kumimoji="0" lang="en-US"/>
@@ -230,7 +246,7 @@
           </a:lstStyle>
           <a:p>
             <a:r>
-              <a:rPr kumimoji="0" lang="es-ES" smtClean="0"/>
+              <a:rPr kumimoji="0" lang="es-ES"/>
               <a:t>Haga clic para modificar el estilo de subtítulo del patrón</a:t>
             </a:r>
             <a:endParaRPr kumimoji="0" lang="en-US"/>
@@ -259,7 +275,7 @@
           <a:p>
             <a:fld id="{7A847CFC-816F-41D0-AAC0-9BF4FEBC753E}" type="datetimeFigureOut">
               <a:rPr lang="es-ES" smtClean="0"/>
-              <a:t>09/03/2023</a:t>
+              <a:t>13/03/2023</a:t>
             </a:fld>
             <a:endParaRPr lang="es-ES"/>
           </a:p>
@@ -1052,7 +1068,7 @@
           <a:lstStyle/>
           <a:p>
             <a:r>
-              <a:rPr kumimoji="0" lang="es-ES" smtClean="0"/>
+              <a:rPr kumimoji="0" lang="es-ES"/>
               <a:t>Haga clic para modificar el estilo de título del patrón</a:t>
             </a:r>
             <a:endParaRPr kumimoji="0" lang="en-US"/>
@@ -1076,35 +1092,35 @@
           <a:p>
             <a:pPr lvl="0" eaLnBrk="1" latinLnBrk="0" hangingPunct="1"/>
             <a:r>
-              <a:rPr lang="es-ES" smtClean="0"/>
+              <a:rPr lang="es-ES"/>
               <a:t>Haga clic para modificar el estilo de texto del patrón</a:t>
             </a:r>
           </a:p>
           <a:p>
             <a:pPr lvl="1" eaLnBrk="1" latinLnBrk="0" hangingPunct="1"/>
             <a:r>
-              <a:rPr lang="es-ES" smtClean="0"/>
+              <a:rPr lang="es-ES"/>
               <a:t>Segundo nivel</a:t>
             </a:r>
           </a:p>
           <a:p>
             <a:pPr lvl="2" eaLnBrk="1" latinLnBrk="0" hangingPunct="1"/>
             <a:r>
-              <a:rPr lang="es-ES" smtClean="0"/>
+              <a:rPr lang="es-ES"/>
               <a:t>Tercer nivel</a:t>
             </a:r>
           </a:p>
           <a:p>
             <a:pPr lvl="3" eaLnBrk="1" latinLnBrk="0" hangingPunct="1"/>
             <a:r>
-              <a:rPr lang="es-ES" smtClean="0"/>
+              <a:rPr lang="es-ES"/>
               <a:t>Cuarto nivel</a:t>
             </a:r>
           </a:p>
           <a:p>
             <a:pPr lvl="4" eaLnBrk="1" latinLnBrk="0" hangingPunct="1"/>
             <a:r>
-              <a:rPr lang="es-ES" smtClean="0"/>
+              <a:rPr lang="es-ES"/>
               <a:t>Quinto nivel</a:t>
             </a:r>
             <a:endParaRPr kumimoji="0" lang="en-US"/>
@@ -1128,7 +1144,7 @@
           <a:p>
             <a:fld id="{7A847CFC-816F-41D0-AAC0-9BF4FEBC753E}" type="datetimeFigureOut">
               <a:rPr lang="es-ES" smtClean="0"/>
-              <a:t>09/03/2023</a:t>
+              <a:t>13/03/2023</a:t>
             </a:fld>
             <a:endParaRPr lang="es-ES"/>
           </a:p>
@@ -1222,7 +1238,7 @@
           <a:lstStyle/>
           <a:p>
             <a:r>
-              <a:rPr kumimoji="0" lang="es-ES" smtClean="0"/>
+              <a:rPr kumimoji="0" lang="es-ES"/>
               <a:t>Haga clic para modificar el estilo de título del patrón</a:t>
             </a:r>
             <a:endParaRPr kumimoji="0" lang="en-US"/>
@@ -1251,35 +1267,35 @@
           <a:p>
             <a:pPr lvl="0" eaLnBrk="1" latinLnBrk="0" hangingPunct="1"/>
             <a:r>
-              <a:rPr lang="es-ES" smtClean="0"/>
+              <a:rPr lang="es-ES"/>
               <a:t>Haga clic para modificar el estilo de texto del patrón</a:t>
             </a:r>
           </a:p>
           <a:p>
             <a:pPr lvl="1" eaLnBrk="1" latinLnBrk="0" hangingPunct="1"/>
             <a:r>
-              <a:rPr lang="es-ES" smtClean="0"/>
+              <a:rPr lang="es-ES"/>
               <a:t>Segundo nivel</a:t>
             </a:r>
           </a:p>
           <a:p>
             <a:pPr lvl="2" eaLnBrk="1" latinLnBrk="0" hangingPunct="1"/>
             <a:r>
-              <a:rPr lang="es-ES" smtClean="0"/>
+              <a:rPr lang="es-ES"/>
               <a:t>Tercer nivel</a:t>
             </a:r>
           </a:p>
           <a:p>
             <a:pPr lvl="3" eaLnBrk="1" latinLnBrk="0" hangingPunct="1"/>
             <a:r>
-              <a:rPr lang="es-ES" smtClean="0"/>
+              <a:rPr lang="es-ES"/>
               <a:t>Cuarto nivel</a:t>
             </a:r>
           </a:p>
           <a:p>
             <a:pPr lvl="4" eaLnBrk="1" latinLnBrk="0" hangingPunct="1"/>
             <a:r>
-              <a:rPr lang="es-ES" smtClean="0"/>
+              <a:rPr lang="es-ES"/>
               <a:t>Quinto nivel</a:t>
             </a:r>
             <a:endParaRPr kumimoji="0" lang="en-US"/>
@@ -1303,7 +1319,7 @@
           <a:p>
             <a:fld id="{7A847CFC-816F-41D0-AAC0-9BF4FEBC753E}" type="datetimeFigureOut">
               <a:rPr lang="es-ES" smtClean="0"/>
-              <a:t>09/03/2023</a:t>
+              <a:t>13/03/2023</a:t>
             </a:fld>
             <a:endParaRPr lang="es-ES"/>
           </a:p>
@@ -1392,7 +1408,7 @@
           <a:lstStyle/>
           <a:p>
             <a:r>
-              <a:rPr kumimoji="0" lang="es-ES" smtClean="0"/>
+              <a:rPr kumimoji="0" lang="es-ES"/>
               <a:t>Haga clic para modificar el estilo de título del patrón</a:t>
             </a:r>
             <a:endParaRPr kumimoji="0" lang="en-US"/>
@@ -1421,35 +1437,35 @@
           <a:p>
             <a:pPr lvl="0" eaLnBrk="1" latinLnBrk="0" hangingPunct="1"/>
             <a:r>
-              <a:rPr lang="es-ES" smtClean="0"/>
+              <a:rPr lang="es-ES"/>
               <a:t>Haga clic para modificar el estilo de texto del patrón</a:t>
             </a:r>
           </a:p>
           <a:p>
             <a:pPr lvl="1" eaLnBrk="1" latinLnBrk="0" hangingPunct="1"/>
             <a:r>
-              <a:rPr lang="es-ES" smtClean="0"/>
+              <a:rPr lang="es-ES"/>
               <a:t>Segundo nivel</a:t>
             </a:r>
           </a:p>
           <a:p>
             <a:pPr lvl="2" eaLnBrk="1" latinLnBrk="0" hangingPunct="1"/>
             <a:r>
-              <a:rPr lang="es-ES" smtClean="0"/>
+              <a:rPr lang="es-ES"/>
               <a:t>Tercer nivel</a:t>
             </a:r>
           </a:p>
           <a:p>
             <a:pPr lvl="3" eaLnBrk="1" latinLnBrk="0" hangingPunct="1"/>
             <a:r>
-              <a:rPr lang="es-ES" smtClean="0"/>
+              <a:rPr lang="es-ES"/>
               <a:t>Cuarto nivel</a:t>
             </a:r>
           </a:p>
           <a:p>
             <a:pPr lvl="4" eaLnBrk="1" latinLnBrk="0" hangingPunct="1"/>
             <a:r>
-              <a:rPr lang="es-ES" smtClean="0"/>
+              <a:rPr lang="es-ES"/>
               <a:t>Quinto nivel</a:t>
             </a:r>
             <a:endParaRPr kumimoji="0" lang="en-US"/>
@@ -1473,7 +1489,7 @@
           <a:p>
             <a:fld id="{7A847CFC-816F-41D0-AAC0-9BF4FEBC753E}" type="datetimeFigureOut">
               <a:rPr lang="es-ES" smtClean="0"/>
-              <a:t>09/03/2023</a:t>
+              <a:t>13/03/2023</a:t>
             </a:fld>
             <a:endParaRPr lang="es-ES"/>
           </a:p>
@@ -1577,7 +1593,7 @@
           </a:lstStyle>
           <a:p>
             <a:r>
-              <a:rPr kumimoji="0" lang="es-ES" smtClean="0"/>
+              <a:rPr kumimoji="0" lang="es-ES"/>
               <a:t>Haga clic para modificar el estilo de título del patrón</a:t>
             </a:r>
             <a:endParaRPr kumimoji="0" lang="en-US"/>
@@ -1655,7 +1671,7 @@
           <a:p>
             <a:pPr lvl="0" eaLnBrk="1" latinLnBrk="0" hangingPunct="1"/>
             <a:r>
-              <a:rPr kumimoji="0" lang="es-ES" smtClean="0"/>
+              <a:rPr kumimoji="0" lang="es-ES"/>
               <a:t>Haga clic para modificar el estilo de texto del patrón</a:t>
             </a:r>
           </a:p>
@@ -1683,7 +1699,7 @@
           <a:p>
             <a:fld id="{7A847CFC-816F-41D0-AAC0-9BF4FEBC753E}" type="datetimeFigureOut">
               <a:rPr lang="es-ES" smtClean="0"/>
-              <a:t>09/03/2023</a:t>
+              <a:t>13/03/2023</a:t>
             </a:fld>
             <a:endParaRPr lang="es-ES"/>
           </a:p>
@@ -2473,7 +2489,7 @@
           <a:lstStyle/>
           <a:p>
             <a:r>
-              <a:rPr kumimoji="0" lang="es-ES" smtClean="0"/>
+              <a:rPr kumimoji="0" lang="es-ES"/>
               <a:t>Haga clic para modificar el estilo de título del patrón</a:t>
             </a:r>
             <a:endParaRPr kumimoji="0" lang="en-US"/>
@@ -2497,7 +2513,7 @@
           <a:p>
             <a:fld id="{7A847CFC-816F-41D0-AAC0-9BF4FEBC753E}" type="datetimeFigureOut">
               <a:rPr lang="es-ES" smtClean="0"/>
-              <a:t>09/03/2023</a:t>
+              <a:t>13/03/2023</a:t>
             </a:fld>
             <a:endParaRPr lang="es-ES"/>
           </a:p>
@@ -2567,35 +2583,35 @@
           <a:p>
             <a:pPr lvl="0" eaLnBrk="1" latinLnBrk="0" hangingPunct="1"/>
             <a:r>
-              <a:rPr lang="es-ES" smtClean="0"/>
+              <a:rPr lang="es-ES"/>
               <a:t>Haga clic para modificar el estilo de texto del patrón</a:t>
             </a:r>
           </a:p>
           <a:p>
             <a:pPr lvl="1" eaLnBrk="1" latinLnBrk="0" hangingPunct="1"/>
             <a:r>
-              <a:rPr lang="es-ES" smtClean="0"/>
+              <a:rPr lang="es-ES"/>
               <a:t>Segundo nivel</a:t>
             </a:r>
           </a:p>
           <a:p>
             <a:pPr lvl="2" eaLnBrk="1" latinLnBrk="0" hangingPunct="1"/>
             <a:r>
-              <a:rPr lang="es-ES" smtClean="0"/>
+              <a:rPr lang="es-ES"/>
               <a:t>Tercer nivel</a:t>
             </a:r>
           </a:p>
           <a:p>
             <a:pPr lvl="3" eaLnBrk="1" latinLnBrk="0" hangingPunct="1"/>
             <a:r>
-              <a:rPr lang="es-ES" smtClean="0"/>
+              <a:rPr lang="es-ES"/>
               <a:t>Cuarto nivel</a:t>
             </a:r>
           </a:p>
           <a:p>
             <a:pPr lvl="4" eaLnBrk="1" latinLnBrk="0" hangingPunct="1"/>
             <a:r>
-              <a:rPr lang="es-ES" smtClean="0"/>
+              <a:rPr lang="es-ES"/>
               <a:t>Quinto nivel</a:t>
             </a:r>
             <a:endParaRPr kumimoji="0" lang="en-US"/>
@@ -2624,35 +2640,35 @@
           <a:p>
             <a:pPr lvl="0" eaLnBrk="1" latinLnBrk="0" hangingPunct="1"/>
             <a:r>
-              <a:rPr lang="es-ES" smtClean="0"/>
+              <a:rPr lang="es-ES"/>
               <a:t>Haga clic para modificar el estilo de texto del patrón</a:t>
             </a:r>
           </a:p>
           <a:p>
             <a:pPr lvl="1" eaLnBrk="1" latinLnBrk="0" hangingPunct="1"/>
             <a:r>
-              <a:rPr lang="es-ES" smtClean="0"/>
+              <a:rPr lang="es-ES"/>
               <a:t>Segundo nivel</a:t>
             </a:r>
           </a:p>
           <a:p>
             <a:pPr lvl="2" eaLnBrk="1" latinLnBrk="0" hangingPunct="1"/>
             <a:r>
-              <a:rPr lang="es-ES" smtClean="0"/>
+              <a:rPr lang="es-ES"/>
               <a:t>Tercer nivel</a:t>
             </a:r>
           </a:p>
           <a:p>
             <a:pPr lvl="3" eaLnBrk="1" latinLnBrk="0" hangingPunct="1"/>
             <a:r>
-              <a:rPr lang="es-ES" smtClean="0"/>
+              <a:rPr lang="es-ES"/>
               <a:t>Cuarto nivel</a:t>
             </a:r>
           </a:p>
           <a:p>
             <a:pPr lvl="4" eaLnBrk="1" latinLnBrk="0" hangingPunct="1"/>
             <a:r>
-              <a:rPr lang="es-ES" smtClean="0"/>
+              <a:rPr lang="es-ES"/>
               <a:t>Quinto nivel</a:t>
             </a:r>
             <a:endParaRPr kumimoji="0" lang="en-US"/>
@@ -2709,7 +2725,7 @@
           </a:lstStyle>
           <a:p>
             <a:r>
-              <a:rPr kumimoji="0" lang="es-ES" smtClean="0"/>
+              <a:rPr kumimoji="0" lang="es-ES"/>
               <a:t>Haga clic para modificar el estilo de título del patrón</a:t>
             </a:r>
             <a:endParaRPr kumimoji="0" lang="en-US"/>
@@ -2733,7 +2749,7 @@
           <a:p>
             <a:fld id="{7A847CFC-816F-41D0-AAC0-9BF4FEBC753E}" type="datetimeFigureOut">
               <a:rPr lang="es-ES" smtClean="0"/>
-              <a:t>09/03/2023</a:t>
+              <a:t>13/03/2023</a:t>
             </a:fld>
             <a:endParaRPr lang="es-ES"/>
           </a:p>
@@ -2803,35 +2819,35 @@
           <a:p>
             <a:pPr lvl="0" eaLnBrk="1" latinLnBrk="0" hangingPunct="1"/>
             <a:r>
-              <a:rPr lang="es-ES" smtClean="0"/>
+              <a:rPr lang="es-ES"/>
               <a:t>Haga clic para modificar el estilo de texto del patrón</a:t>
             </a:r>
           </a:p>
           <a:p>
             <a:pPr lvl="1" eaLnBrk="1" latinLnBrk="0" hangingPunct="1"/>
             <a:r>
-              <a:rPr lang="es-ES" smtClean="0"/>
+              <a:rPr lang="es-ES"/>
               <a:t>Segundo nivel</a:t>
             </a:r>
           </a:p>
           <a:p>
             <a:pPr lvl="2" eaLnBrk="1" latinLnBrk="0" hangingPunct="1"/>
             <a:r>
-              <a:rPr lang="es-ES" smtClean="0"/>
+              <a:rPr lang="es-ES"/>
               <a:t>Tercer nivel</a:t>
             </a:r>
           </a:p>
           <a:p>
             <a:pPr lvl="3" eaLnBrk="1" latinLnBrk="0" hangingPunct="1"/>
             <a:r>
-              <a:rPr lang="es-ES" smtClean="0"/>
+              <a:rPr lang="es-ES"/>
               <a:t>Cuarto nivel</a:t>
             </a:r>
           </a:p>
           <a:p>
             <a:pPr lvl="4" eaLnBrk="1" latinLnBrk="0" hangingPunct="1"/>
             <a:r>
-              <a:rPr lang="es-ES" smtClean="0"/>
+              <a:rPr lang="es-ES"/>
               <a:t>Quinto nivel</a:t>
             </a:r>
             <a:endParaRPr kumimoji="0" lang="en-US"/>
@@ -2860,35 +2876,35 @@
           <a:p>
             <a:pPr lvl="0" eaLnBrk="1" latinLnBrk="0" hangingPunct="1"/>
             <a:r>
-              <a:rPr lang="es-ES" smtClean="0"/>
+              <a:rPr lang="es-ES"/>
               <a:t>Haga clic para modificar el estilo de texto del patrón</a:t>
             </a:r>
           </a:p>
           <a:p>
             <a:pPr lvl="1" eaLnBrk="1" latinLnBrk="0" hangingPunct="1"/>
             <a:r>
-              <a:rPr lang="es-ES" smtClean="0"/>
+              <a:rPr lang="es-ES"/>
               <a:t>Segundo nivel</a:t>
             </a:r>
           </a:p>
           <a:p>
             <a:pPr lvl="2" eaLnBrk="1" latinLnBrk="0" hangingPunct="1"/>
             <a:r>
-              <a:rPr lang="es-ES" smtClean="0"/>
+              <a:rPr lang="es-ES"/>
               <a:t>Tercer nivel</a:t>
             </a:r>
           </a:p>
           <a:p>
             <a:pPr lvl="3" eaLnBrk="1" latinLnBrk="0" hangingPunct="1"/>
             <a:r>
-              <a:rPr lang="es-ES" smtClean="0"/>
+              <a:rPr lang="es-ES"/>
               <a:t>Cuarto nivel</a:t>
             </a:r>
           </a:p>
           <a:p>
             <a:pPr lvl="4" eaLnBrk="1" latinLnBrk="0" hangingPunct="1"/>
             <a:r>
-              <a:rPr lang="es-ES" smtClean="0"/>
+              <a:rPr lang="es-ES"/>
               <a:t>Quinto nivel</a:t>
             </a:r>
             <a:endParaRPr kumimoji="0" lang="en-US"/>
@@ -2937,7 +2953,7 @@
           <a:p>
             <a:pPr lvl="0" eaLnBrk="1" latinLnBrk="0" hangingPunct="1"/>
             <a:r>
-              <a:rPr kumimoji="0" lang="es-ES" smtClean="0"/>
+              <a:rPr kumimoji="0" lang="es-ES"/>
               <a:t>Haga clic para modificar el estilo de texto del patrón</a:t>
             </a:r>
           </a:p>
@@ -2985,7 +3001,7 @@
           <a:p>
             <a:pPr lvl="0" eaLnBrk="1" latinLnBrk="0" hangingPunct="1"/>
             <a:r>
-              <a:rPr kumimoji="0" lang="es-ES" smtClean="0"/>
+              <a:rPr kumimoji="0" lang="es-ES"/>
               <a:t>Haga clic para modificar el estilo de texto del patrón</a:t>
             </a:r>
           </a:p>
@@ -3032,7 +3048,7 @@
           <a:lstStyle/>
           <a:p>
             <a:r>
-              <a:rPr kumimoji="0" lang="es-ES" smtClean="0"/>
+              <a:rPr kumimoji="0" lang="es-ES"/>
               <a:t>Haga clic para modificar el estilo de título del patrón</a:t>
             </a:r>
             <a:endParaRPr kumimoji="0" lang="en-US"/>
@@ -3056,7 +3072,7 @@
           <a:p>
             <a:fld id="{7A847CFC-816F-41D0-AAC0-9BF4FEBC753E}" type="datetimeFigureOut">
               <a:rPr lang="es-ES" smtClean="0"/>
-              <a:t>09/03/2023</a:t>
+              <a:t>13/03/2023</a:t>
             </a:fld>
             <a:endParaRPr lang="es-ES"/>
           </a:p>
@@ -3146,7 +3162,7 @@
           <a:p>
             <a:fld id="{7A847CFC-816F-41D0-AAC0-9BF4FEBC753E}" type="datetimeFigureOut">
               <a:rPr lang="es-ES" smtClean="0"/>
-              <a:t>09/03/2023</a:t>
+              <a:t>13/03/2023</a:t>
             </a:fld>
             <a:endParaRPr lang="es-ES"/>
           </a:p>
@@ -3289,7 +3305,7 @@
           </a:lstStyle>
           <a:p>
             <a:r>
-              <a:rPr kumimoji="0" lang="es-ES" smtClean="0"/>
+              <a:rPr kumimoji="0" lang="es-ES"/>
               <a:t>Haga clic para modificar el estilo de título del patrón</a:t>
             </a:r>
             <a:endParaRPr kumimoji="0" lang="en-US"/>
@@ -3345,7 +3361,7 @@
           <a:p>
             <a:pPr lvl="0" eaLnBrk="1" latinLnBrk="0" hangingPunct="1"/>
             <a:r>
-              <a:rPr kumimoji="0" lang="es-ES" smtClean="0"/>
+              <a:rPr kumimoji="0" lang="es-ES"/>
               <a:t>Haga clic para modificar el estilo de texto del patrón</a:t>
             </a:r>
           </a:p>
@@ -3611,35 +3627,35 @@
           <a:p>
             <a:pPr lvl="0" eaLnBrk="1" latinLnBrk="0" hangingPunct="1"/>
             <a:r>
-              <a:rPr lang="es-ES" smtClean="0"/>
+              <a:rPr lang="es-ES"/>
               <a:t>Haga clic para modificar el estilo de texto del patrón</a:t>
             </a:r>
           </a:p>
           <a:p>
             <a:pPr lvl="1" eaLnBrk="1" latinLnBrk="0" hangingPunct="1"/>
             <a:r>
-              <a:rPr lang="es-ES" smtClean="0"/>
+              <a:rPr lang="es-ES"/>
               <a:t>Segundo nivel</a:t>
             </a:r>
           </a:p>
           <a:p>
             <a:pPr lvl="2" eaLnBrk="1" latinLnBrk="0" hangingPunct="1"/>
             <a:r>
-              <a:rPr lang="es-ES" smtClean="0"/>
+              <a:rPr lang="es-ES"/>
               <a:t>Tercer nivel</a:t>
             </a:r>
           </a:p>
           <a:p>
             <a:pPr lvl="3" eaLnBrk="1" latinLnBrk="0" hangingPunct="1"/>
             <a:r>
-              <a:rPr lang="es-ES" smtClean="0"/>
+              <a:rPr lang="es-ES"/>
               <a:t>Cuarto nivel</a:t>
             </a:r>
           </a:p>
           <a:p>
             <a:pPr lvl="4" eaLnBrk="1" latinLnBrk="0" hangingPunct="1"/>
             <a:r>
-              <a:rPr lang="es-ES" smtClean="0"/>
+              <a:rPr lang="es-ES"/>
               <a:t>Quinto nivel</a:t>
             </a:r>
             <a:endParaRPr kumimoji="0" lang="en-US"/>
@@ -3663,7 +3679,7 @@
           <a:p>
             <a:fld id="{7A847CFC-816F-41D0-AAC0-9BF4FEBC753E}" type="datetimeFigureOut">
               <a:rPr lang="es-ES" smtClean="0"/>
-              <a:t>09/03/2023</a:t>
+              <a:t>13/03/2023</a:t>
             </a:fld>
             <a:endParaRPr lang="es-ES"/>
           </a:p>
@@ -3843,7 +3859,7 @@
           </a:lstStyle>
           <a:p>
             <a:r>
-              <a:rPr kumimoji="0" lang="es-ES" smtClean="0"/>
+              <a:rPr kumimoji="0" lang="es-ES"/>
               <a:t>Haga clic para modificar el estilo de título del patrón</a:t>
             </a:r>
             <a:endParaRPr kumimoji="0" lang="en-US"/>
@@ -3902,7 +3918,7 @@
               <a:buNone/>
             </a:pPr>
             <a:r>
-              <a:rPr kumimoji="0" lang="es-ES" smtClean="0"/>
+              <a:rPr kumimoji="0" lang="es-ES"/>
               <a:t>Haga clic en el icono para agregar una imagen</a:t>
             </a:r>
             <a:endParaRPr kumimoji="0" lang="en-US" dirty="0"/>
@@ -3957,7 +3973,7 @@
           <a:p>
             <a:pPr lvl="0" eaLnBrk="1" latinLnBrk="0" hangingPunct="1"/>
             <a:r>
-              <a:rPr kumimoji="0" lang="es-ES" smtClean="0"/>
+              <a:rPr kumimoji="0" lang="es-ES"/>
               <a:t>Haga clic para modificar el estilo de texto del patrón</a:t>
             </a:r>
           </a:p>
@@ -4174,7 +4190,7 @@
           <a:p>
             <a:fld id="{7A847CFC-816F-41D0-AAC0-9BF4FEBC753E}" type="datetimeFigureOut">
               <a:rPr lang="es-ES" smtClean="0"/>
-              <a:t>09/03/2023</a:t>
+              <a:t>13/03/2023</a:t>
             </a:fld>
             <a:endParaRPr lang="es-ES"/>
           </a:p>
@@ -4317,7 +4333,7 @@
           <a:lstStyle/>
           <a:p>
             <a:r>
-              <a:rPr kumimoji="0" lang="es-ES" smtClean="0"/>
+              <a:rPr kumimoji="0" lang="es-ES"/>
               <a:t>Haga clic para modificar el estilo de título del patrón</a:t>
             </a:r>
             <a:endParaRPr kumimoji="0" lang="en-US"/>
@@ -4351,35 +4367,35 @@
           <a:p>
             <a:pPr lvl="0" eaLnBrk="1" latinLnBrk="0" hangingPunct="1"/>
             <a:r>
-              <a:rPr kumimoji="0" lang="es-ES" smtClean="0"/>
+              <a:rPr kumimoji="0" lang="es-ES"/>
               <a:t>Haga clic para modificar el estilo de texto del patrón</a:t>
             </a:r>
           </a:p>
           <a:p>
             <a:pPr lvl="1" eaLnBrk="1" latinLnBrk="0" hangingPunct="1"/>
             <a:r>
-              <a:rPr kumimoji="0" lang="es-ES" smtClean="0"/>
+              <a:rPr kumimoji="0" lang="es-ES"/>
               <a:t>Segundo nivel</a:t>
             </a:r>
           </a:p>
           <a:p>
             <a:pPr lvl="2" eaLnBrk="1" latinLnBrk="0" hangingPunct="1"/>
             <a:r>
-              <a:rPr kumimoji="0" lang="es-ES" smtClean="0"/>
+              <a:rPr kumimoji="0" lang="es-ES"/>
               <a:t>Tercer nivel</a:t>
             </a:r>
           </a:p>
           <a:p>
             <a:pPr lvl="3" eaLnBrk="1" latinLnBrk="0" hangingPunct="1"/>
             <a:r>
-              <a:rPr kumimoji="0" lang="es-ES" smtClean="0"/>
+              <a:rPr kumimoji="0" lang="es-ES"/>
               <a:t>Cuarto nivel</a:t>
             </a:r>
           </a:p>
           <a:p>
             <a:pPr lvl="4" eaLnBrk="1" latinLnBrk="0" hangingPunct="1"/>
             <a:r>
-              <a:rPr kumimoji="0" lang="es-ES" smtClean="0"/>
+              <a:rPr kumimoji="0" lang="es-ES"/>
               <a:t>Quinto nivel</a:t>
             </a:r>
             <a:endParaRPr kumimoji="0" lang="en-US"/>
@@ -4419,7 +4435,7 @@
           <a:p>
             <a:fld id="{7A847CFC-816F-41D0-AAC0-9BF4FEBC753E}" type="datetimeFigureOut">
               <a:rPr lang="es-ES" smtClean="0"/>
-              <a:t>09/03/2023</a:t>
+              <a:t>13/03/2023</a:t>
             </a:fld>
             <a:endParaRPr lang="es-ES"/>
           </a:p>
@@ -5064,13 +5080,6 @@
   <p:clrMapOvr>
     <a:masterClrMapping/>
   </p:clrMapOvr>
-  <p:timing>
-    <p:tnLst>
-      <p:par>
-        <p:cTn id="1" dur="indefinite" restart="never" nodeType="tmRoot"/>
-      </p:par>
-    </p:tnLst>
-  </p:timing>
 </p:sld>
 </file>
 
@@ -5115,11 +5124,11 @@
           <a:p>
             <a:pPr marL="342900" lvl="0" indent="-342900"/>
             <a:r>
-              <a:rPr lang="ca-ES" sz="4000" dirty="0" smtClean="0"/>
+              <a:rPr lang="ca-ES" sz="4000" dirty="0"/>
               <a:t>Fase </a:t>
             </a:r>
             <a:r>
-              <a:rPr lang="ca-ES" sz="4000" dirty="0" err="1" smtClean="0"/>
+              <a:rPr lang="ca-ES" sz="4000" dirty="0" err="1"/>
               <a:t>Intermitja</a:t>
             </a:r>
             <a:endParaRPr lang="ca-ES" sz="4000" dirty="0"/>
@@ -5152,14 +5161,14 @@
               <a:buFont typeface="+mj-lt"/>
               <a:buAutoNum type="arabicPeriod"/>
             </a:pPr>
-            <a:endParaRPr lang="ca-ES" dirty="0" smtClean="0"/>
+            <a:endParaRPr lang="ca-ES" dirty="0"/>
           </a:p>
           <a:p>
             <a:pPr marL="457200" indent="-457200">
               <a:buFont typeface="+mj-lt"/>
               <a:buAutoNum type="arabicPeriod"/>
             </a:pPr>
-            <a:endParaRPr lang="ca-ES" dirty="0" smtClean="0"/>
+            <a:endParaRPr lang="ca-ES" dirty="0"/>
           </a:p>
           <a:p>
             <a:endParaRPr lang="ca-ES" dirty="0"/>
@@ -5189,7 +5198,7 @@
         </p:blipFill>
         <p:spPr bwMode="auto">
           <a:xfrm>
-            <a:off x="2016549" y="2276872"/>
+            <a:off x="1907704" y="2412947"/>
             <a:ext cx="5003723" cy="3600400"/>
           </a:xfrm>
           <a:prstGeom prst="rect">
@@ -5215,8 +5224,8 @@
         </p:nvSpPr>
         <p:spPr>
           <a:xfrm>
-            <a:off x="2582043" y="5370868"/>
-            <a:ext cx="3872733" cy="1754326"/>
+            <a:off x="2027590" y="5476975"/>
+            <a:ext cx="5193495" cy="1846659"/>
           </a:xfrm>
           <a:prstGeom prst="rect">
             <a:avLst/>
@@ -5228,41 +5237,6 @@
             <a:spAutoFit/>
           </a:bodyPr>
           <a:lstStyle/>
-          <a:p>
-            <a:pPr marL="285750" indent="-285750">
-              <a:buFont typeface="Arial" panose="020B0604020202020204" pitchFamily="34" charset="0"/>
-              <a:buChar char="•"/>
-            </a:pPr>
-            <a:endParaRPr lang="es-ES" dirty="0" smtClean="0"/>
-          </a:p>
-          <a:p>
-            <a:pPr marL="285750" indent="-285750">
-              <a:buFont typeface="Arial" panose="020B0604020202020204" pitchFamily="34" charset="0"/>
-              <a:buChar char="•"/>
-            </a:pPr>
-            <a:endParaRPr lang="es-ES" dirty="0" smtClean="0"/>
-          </a:p>
-          <a:p>
-            <a:r>
-              <a:rPr lang="es-ES" dirty="0" smtClean="0"/>
-              <a:t>Crear i administrar base de </a:t>
-            </a:r>
-            <a:r>
-              <a:rPr lang="es-ES" dirty="0" err="1" smtClean="0"/>
-              <a:t>dades</a:t>
-            </a:r>
-            <a:endParaRPr lang="es-ES" dirty="0" smtClean="0"/>
-          </a:p>
-          <a:p>
-            <a:pPr marL="285750" indent="-285750">
-              <a:buFont typeface="Arial" panose="020B0604020202020204" pitchFamily="34" charset="0"/>
-              <a:buChar char="•"/>
-            </a:pPr>
-            <a:endParaRPr lang="es-ES" dirty="0" smtClean="0"/>
-          </a:p>
-          <a:p>
-            <a:endParaRPr lang="es-ES" dirty="0" smtClean="0"/>
-          </a:p>
           <a:p>
             <a:pPr marL="285750" indent="-285750">
               <a:buFont typeface="Arial" panose="020B0604020202020204" pitchFamily="34" charset="0"/>
@@ -5270,6 +5244,41 @@
             </a:pPr>
             <a:endParaRPr lang="es-ES" dirty="0"/>
           </a:p>
+          <a:p>
+            <a:pPr marL="285750" indent="-285750">
+              <a:buFont typeface="Arial" panose="020B0604020202020204" pitchFamily="34" charset="0"/>
+              <a:buChar char="•"/>
+            </a:pPr>
+            <a:endParaRPr lang="es-ES" dirty="0"/>
+          </a:p>
+          <a:p>
+            <a:r>
+              <a:rPr lang="es-ES" sz="2400" dirty="0"/>
+              <a:t>Crear i administrar base de </a:t>
+            </a:r>
+            <a:r>
+              <a:rPr lang="es-ES" sz="2400" dirty="0" err="1"/>
+              <a:t>dades</a:t>
+            </a:r>
+            <a:endParaRPr lang="es-ES" sz="2400" dirty="0"/>
+          </a:p>
+          <a:p>
+            <a:pPr marL="285750" indent="-285750">
+              <a:buFont typeface="Arial" panose="020B0604020202020204" pitchFamily="34" charset="0"/>
+              <a:buChar char="•"/>
+            </a:pPr>
+            <a:endParaRPr lang="es-ES" dirty="0"/>
+          </a:p>
+          <a:p>
+            <a:endParaRPr lang="es-ES" dirty="0"/>
+          </a:p>
+          <a:p>
+            <a:pPr marL="285750" indent="-285750">
+              <a:buFont typeface="Arial" panose="020B0604020202020204" pitchFamily="34" charset="0"/>
+              <a:buChar char="•"/>
+            </a:pPr>
+            <a:endParaRPr lang="es-ES" dirty="0"/>
+          </a:p>
         </p:txBody>
       </p:sp>
       <p:sp>
@@ -5281,7 +5290,7 @@
         <p:spPr>
           <a:xfrm>
             <a:off x="882840" y="2043615"/>
-            <a:ext cx="1133709" cy="646331"/>
+            <a:ext cx="1699203" cy="738664"/>
           </a:xfrm>
           <a:prstGeom prst="rect">
             <a:avLst/>
@@ -5295,7 +5304,7 @@
           <a:lstStyle/>
           <a:p>
             <a:r>
-              <a:rPr lang="es-ES" dirty="0" err="1"/>
+              <a:rPr lang="es-ES" sz="2400" dirty="0" err="1"/>
               <a:t>Testejar</a:t>
             </a:r>
             <a:endParaRPr lang="es-ES" dirty="0"/>
@@ -5313,8 +5322,8 @@
         </p:nvSpPr>
         <p:spPr>
           <a:xfrm>
-            <a:off x="5996461" y="1905115"/>
-            <a:ext cx="2904630" cy="923330"/>
+            <a:off x="5494108" y="1636190"/>
+            <a:ext cx="3266686" cy="1107996"/>
           </a:xfrm>
           <a:prstGeom prst="rect">
             <a:avLst/>
@@ -5328,22 +5337,22 @@
           <a:lstStyle/>
           <a:p>
             <a:r>
-              <a:rPr lang="es-ES" dirty="0"/>
+              <a:rPr lang="es-ES" sz="2400" dirty="0"/>
               <a:t>Codificar el </a:t>
             </a:r>
             <a:r>
-              <a:rPr lang="es-ES" dirty="0" err="1"/>
+              <a:rPr lang="es-ES" sz="2400" dirty="0" err="1"/>
               <a:t>front-end</a:t>
             </a:r>
             <a:r>
-              <a:rPr lang="es-ES" dirty="0"/>
+              <a:rPr lang="es-ES" sz="2400" dirty="0"/>
               <a:t> i back-</a:t>
             </a:r>
             <a:r>
-              <a:rPr lang="es-ES" dirty="0" err="1"/>
+              <a:rPr lang="es-ES" sz="2400" dirty="0" err="1"/>
               <a:t>end</a:t>
             </a:r>
-            <a:endParaRPr lang="es-ES" dirty="0"/>
+            <a:endParaRPr lang="es-ES" sz="2400" dirty="0"/>
           </a:p>
           <a:p>
             <a:endParaRPr lang="es-ES" dirty="0"/>
@@ -5360,13 +5369,6 @@
   <p:clrMapOvr>
     <a:masterClrMapping/>
   </p:clrMapOvr>
-  <p:timing>
-    <p:tnLst>
-      <p:par>
-        <p:cTn id="1" dur="indefinite" restart="never" nodeType="tmRoot"/>
-      </p:par>
-    </p:tnLst>
-  </p:timing>
 </p:sld>
 </file>
 
@@ -5411,10 +5413,9 @@
           <a:p>
             <a:pPr marL="342900" lvl="0" indent="-342900"/>
             <a:r>
-              <a:rPr lang="ca-ES" sz="4000" dirty="0" smtClean="0"/>
+              <a:rPr lang="ca-ES" sz="4000" dirty="0"/>
               <a:t>Fase Final</a:t>
             </a:r>
-            <a:endParaRPr lang="ca-ES" sz="4000" dirty="0"/>
           </a:p>
         </p:txBody>
       </p:sp>
@@ -5444,14 +5445,14 @@
               <a:buFont typeface="+mj-lt"/>
               <a:buAutoNum type="arabicPeriod"/>
             </a:pPr>
-            <a:endParaRPr lang="ca-ES" dirty="0" smtClean="0"/>
+            <a:endParaRPr lang="ca-ES" dirty="0"/>
           </a:p>
           <a:p>
             <a:pPr marL="457200" indent="-457200">
               <a:buFont typeface="+mj-lt"/>
               <a:buAutoNum type="arabicPeriod"/>
             </a:pPr>
-            <a:endParaRPr lang="ca-ES" dirty="0" smtClean="0"/>
+            <a:endParaRPr lang="ca-ES" dirty="0"/>
           </a:p>
           <a:p>
             <a:endParaRPr lang="ca-ES" dirty="0"/>
@@ -5508,7 +5509,7 @@
         <p:spPr>
           <a:xfrm>
             <a:off x="5581500" y="2737663"/>
-            <a:ext cx="2662908" cy="2246769"/>
+            <a:ext cx="2345514" cy="1938992"/>
           </a:xfrm>
           <a:prstGeom prst="rect">
             <a:avLst/>
@@ -5526,25 +5527,25 @@
               <a:buChar char="•"/>
             </a:pPr>
             <a:r>
-              <a:rPr lang="es-ES" sz="2800" dirty="0" err="1" smtClean="0"/>
+              <a:rPr lang="es-ES" sz="2400" dirty="0" err="1"/>
               <a:t>User</a:t>
             </a:r>
             <a:r>
-              <a:rPr lang="es-ES" sz="2800" dirty="0" smtClean="0"/>
+              <a:rPr lang="es-ES" sz="2400" dirty="0"/>
               <a:t> </a:t>
             </a:r>
             <a:r>
-              <a:rPr lang="es-ES" sz="2800" dirty="0" err="1" smtClean="0"/>
+              <a:rPr lang="es-ES" sz="2400" dirty="0" err="1"/>
               <a:t>testing</a:t>
             </a:r>
-            <a:endParaRPr lang="es-ES" sz="2800" dirty="0" smtClean="0"/>
+            <a:endParaRPr lang="es-ES" sz="2400" dirty="0"/>
           </a:p>
           <a:p>
             <a:pPr marL="285750" indent="-285750">
               <a:buFont typeface="Arial" panose="020B0604020202020204" pitchFamily="34" charset="0"/>
               <a:buChar char="•"/>
             </a:pPr>
-            <a:endParaRPr lang="es-ES" sz="2800" dirty="0" smtClean="0"/>
+            <a:endParaRPr lang="es-ES" sz="2400" dirty="0"/>
           </a:p>
           <a:p>
             <a:pPr marL="285750" indent="-285750">
@@ -5552,17 +5553,17 @@
               <a:buChar char="•"/>
             </a:pPr>
             <a:r>
-              <a:rPr lang="es-ES" sz="2800" dirty="0" err="1" smtClean="0"/>
+              <a:rPr lang="es-ES" sz="2400" dirty="0" err="1"/>
               <a:t>Qüestionari</a:t>
             </a:r>
-            <a:endParaRPr lang="es-ES" sz="2800" dirty="0" smtClean="0"/>
+            <a:endParaRPr lang="es-ES" sz="2400" dirty="0"/>
           </a:p>
           <a:p>
             <a:pPr marL="285750" indent="-285750">
               <a:buFont typeface="Arial" panose="020B0604020202020204" pitchFamily="34" charset="0"/>
               <a:buChar char="•"/>
             </a:pPr>
-            <a:endParaRPr lang="es-ES" sz="2800" dirty="0" smtClean="0"/>
+            <a:endParaRPr lang="es-ES" sz="2400" dirty="0"/>
           </a:p>
           <a:p>
             <a:pPr marL="285750" indent="-285750">
@@ -5570,10 +5571,9 @@
               <a:buChar char="•"/>
             </a:pPr>
             <a:r>
-              <a:rPr lang="es-ES" sz="2800" dirty="0" smtClean="0"/>
+              <a:rPr lang="es-ES" sz="2400" dirty="0"/>
               <a:t>Informe final</a:t>
             </a:r>
-            <a:endParaRPr lang="es-ES" sz="2800" dirty="0"/>
           </a:p>
         </p:txBody>
       </p:sp>
@@ -5587,13 +5587,6 @@
   <p:clrMapOvr>
     <a:masterClrMapping/>
   </p:clrMapOvr>
-  <p:timing>
-    <p:tnLst>
-      <p:par>
-        <p:cTn id="1" dur="indefinite" restart="never" nodeType="tmRoot"/>
-      </p:par>
-    </p:tnLst>
-  </p:timing>
 </p:sld>
 </file>
 
@@ -5638,10 +5631,9 @@
           <a:p>
             <a:pPr marL="342900" lvl="0" indent="-342900"/>
             <a:r>
-              <a:rPr lang="ca-ES" sz="4000" dirty="0" smtClean="0"/>
+              <a:rPr lang="ca-ES" sz="4000" dirty="0"/>
               <a:t>Planificació</a:t>
             </a:r>
-            <a:endParaRPr lang="ca-ES" sz="4000" dirty="0"/>
           </a:p>
         </p:txBody>
       </p:sp>
@@ -5671,14 +5663,14 @@
               <a:buFont typeface="+mj-lt"/>
               <a:buAutoNum type="arabicPeriod"/>
             </a:pPr>
-            <a:endParaRPr lang="ca-ES" dirty="0" smtClean="0"/>
+            <a:endParaRPr lang="ca-ES" dirty="0"/>
           </a:p>
           <a:p>
             <a:pPr marL="457200" indent="-457200">
               <a:buFont typeface="+mj-lt"/>
               <a:buAutoNum type="arabicPeriod"/>
             </a:pPr>
-            <a:endParaRPr lang="ca-ES" dirty="0" smtClean="0"/>
+            <a:endParaRPr lang="ca-ES" dirty="0"/>
           </a:p>
           <a:p>
             <a:endParaRPr lang="ca-ES" dirty="0"/>
@@ -5749,13 +5741,6 @@
   <p:clrMapOvr>
     <a:masterClrMapping/>
   </p:clrMapOvr>
-  <p:timing>
-    <p:tnLst>
-      <p:par>
-        <p:cTn id="1" dur="indefinite" restart="never" nodeType="tmRoot"/>
-      </p:par>
-    </p:tnLst>
-  </p:timing>
 </p:sld>
 </file>
 
@@ -5799,10 +5784,9 @@
           <a:lstStyle/>
           <a:p>
             <a:r>
-              <a:rPr lang="ca-ES" sz="4000" dirty="0" smtClean="0"/>
+              <a:rPr lang="ca-ES" sz="4000" dirty="0"/>
               <a:t>Durant aquesta presentació...</a:t>
             </a:r>
-            <a:endParaRPr lang="ca-ES" sz="4000" dirty="0"/>
           </a:p>
         </p:txBody>
       </p:sp>
@@ -5827,13 +5811,6 @@
             <a:normAutofit fontScale="92500" lnSpcReduction="10000"/>
           </a:bodyPr>
           <a:lstStyle/>
-          <a:p>
-            <a:pPr marL="342900" lvl="0" indent="-342900">
-              <a:buFont typeface="Arial" pitchFamily="34" charset="0"/>
-              <a:buChar char="•"/>
-            </a:pPr>
-            <a:endParaRPr lang="ca-ES" dirty="0" smtClean="0"/>
-          </a:p>
           <a:p>
             <a:pPr marL="342900" lvl="0" indent="-342900">
               <a:buFont typeface="Arial" pitchFamily="34" charset="0"/>
@@ -5846,7 +5823,7 @@
               <a:buFont typeface="Arial" pitchFamily="34" charset="0"/>
               <a:buChar char="•"/>
             </a:pPr>
-            <a:endParaRPr lang="ca-ES" dirty="0" smtClean="0"/>
+            <a:endParaRPr lang="ca-ES" dirty="0"/>
           </a:p>
           <a:p>
             <a:pPr marL="342900" lvl="0" indent="-342900">
@@ -5860,24 +5837,31 @@
               <a:buFont typeface="Arial" pitchFamily="34" charset="0"/>
               <a:buChar char="•"/>
             </a:pPr>
-            <a:r>
-              <a:rPr lang="ca-ES" sz="3600" b="0" dirty="0" smtClean="0"/>
+            <a:endParaRPr lang="ca-ES" dirty="0"/>
+          </a:p>
+          <a:p>
+            <a:pPr marL="342900" lvl="0" indent="-342900">
+              <a:buFont typeface="Arial" pitchFamily="34" charset="0"/>
+              <a:buChar char="•"/>
+            </a:pPr>
+            <a:r>
+              <a:rPr lang="ca-ES" sz="3600" b="0" dirty="0"/>
               <a:t>Què és </a:t>
             </a:r>
             <a:r>
-              <a:rPr lang="ca-ES" sz="3600" b="0" dirty="0" err="1" smtClean="0"/>
+              <a:rPr lang="ca-ES" sz="3600" b="0" dirty="0" err="1"/>
               <a:t>Taam</a:t>
             </a:r>
             <a:r>
-              <a:rPr lang="ca-ES" sz="3600" b="0" dirty="0" smtClean="0"/>
+              <a:rPr lang="ca-ES" sz="3600" b="0" dirty="0"/>
               <a:t> </a:t>
             </a:r>
             <a:r>
-              <a:rPr lang="ca-ES" sz="3600" b="0" dirty="0" err="1" smtClean="0"/>
+              <a:rPr lang="ca-ES" sz="3600" b="0" dirty="0" err="1"/>
               <a:t>App</a:t>
             </a:r>
             <a:r>
-              <a:rPr lang="ca-ES" sz="3600" b="0" dirty="0" smtClean="0"/>
+              <a:rPr lang="ca-ES" sz="3600" b="0" dirty="0"/>
               <a:t>?</a:t>
             </a:r>
           </a:p>
@@ -5895,11 +5879,7 @@
             </a:pPr>
             <a:r>
               <a:rPr lang="ca-ES" sz="3600" dirty="0"/>
-              <a:t>Tasques </a:t>
-            </a:r>
-            <a:r>
-              <a:rPr lang="ca-ES" sz="3600" dirty="0" smtClean="0"/>
-              <a:t>principals.</a:t>
+              <a:t>Tasques principals.</a:t>
             </a:r>
           </a:p>
           <a:p>
@@ -5907,7 +5887,7 @@
               <a:buFont typeface="Arial" pitchFamily="34" charset="0"/>
               <a:buChar char="•"/>
             </a:pPr>
-            <a:endParaRPr lang="ca-ES" sz="3600" b="0" dirty="0" smtClean="0"/>
+            <a:endParaRPr lang="ca-ES" sz="3600" b="0" dirty="0"/>
           </a:p>
           <a:p>
             <a:pPr marL="342900" lvl="0" indent="-342900">
@@ -5915,15 +5895,15 @@
               <a:buChar char="•"/>
             </a:pPr>
             <a:r>
-              <a:rPr lang="es-ES" sz="3600" b="1" dirty="0" err="1" smtClean="0"/>
+              <a:rPr lang="es-ES" sz="3600" b="1" dirty="0" err="1"/>
               <a:t>Organització</a:t>
             </a:r>
             <a:r>
-              <a:rPr lang="es-ES" sz="3600" b="1" dirty="0" smtClean="0"/>
+              <a:rPr lang="es-ES" sz="3600" b="1" dirty="0"/>
               <a:t> i </a:t>
             </a:r>
             <a:r>
-              <a:rPr lang="es-ES" sz="3600" b="1" dirty="0" err="1" smtClean="0"/>
+              <a:rPr lang="es-ES" sz="3600" b="1" dirty="0" err="1"/>
               <a:t>tecnologies</a:t>
             </a:r>
             <a:endParaRPr lang="es-ES" b="1" dirty="0"/>
@@ -5940,13 +5920,6 @@
   <p:clrMapOvr>
     <a:masterClrMapping/>
   </p:clrMapOvr>
-  <p:timing>
-    <p:tnLst>
-      <p:par>
-        <p:cTn id="1" dur="indefinite" restart="never" nodeType="tmRoot"/>
-      </p:par>
-    </p:tnLst>
-  </p:timing>
 </p:sld>
 </file>
 
@@ -6182,18 +6155,14 @@
               <a:buChar char="•"/>
             </a:pPr>
             <a:r>
-              <a:rPr lang="es-ES" dirty="0" smtClean="0"/>
+              <a:rPr lang="es-ES" dirty="0"/>
               <a:t>Front-</a:t>
             </a:r>
             <a:r>
               <a:rPr lang="es-ES" dirty="0" err="1"/>
-              <a:t>E</a:t>
-            </a:r>
-            <a:r>
-              <a:rPr lang="es-ES" dirty="0" err="1" smtClean="0"/>
-              <a:t>nd</a:t>
-            </a:r>
-            <a:endParaRPr lang="es-ES" dirty="0" smtClean="0"/>
+              <a:t>End</a:t>
+            </a:r>
+            <a:endParaRPr lang="es-ES" dirty="0"/>
           </a:p>
           <a:p>
             <a:pPr marL="285750" indent="-285750">
@@ -6201,10 +6170,9 @@
               <a:buChar char="•"/>
             </a:pPr>
             <a:r>
-              <a:rPr lang="es-ES" dirty="0" smtClean="0"/>
+              <a:rPr lang="es-ES" dirty="0"/>
               <a:t>Multiplataforma</a:t>
             </a:r>
-            <a:endParaRPr lang="es-ES" dirty="0"/>
           </a:p>
         </p:txBody>
       </p:sp>
@@ -6235,14 +6203,14 @@
               <a:buChar char="•"/>
             </a:pPr>
             <a:r>
-              <a:rPr lang="es-ES" dirty="0" smtClean="0"/>
+              <a:rPr lang="es-ES" dirty="0"/>
               <a:t>Back-</a:t>
             </a:r>
             <a:r>
-              <a:rPr lang="es-ES" dirty="0" err="1" smtClean="0"/>
+              <a:rPr lang="es-ES" dirty="0" err="1"/>
               <a:t>End</a:t>
             </a:r>
-            <a:endParaRPr lang="es-ES" dirty="0" smtClean="0"/>
+            <a:endParaRPr lang="es-ES" dirty="0"/>
           </a:p>
           <a:p>
             <a:pPr marL="285750" indent="-285750">
@@ -6250,34 +6218,34 @@
               <a:buChar char="•"/>
             </a:pPr>
             <a:r>
-              <a:rPr lang="es-ES" dirty="0" err="1" smtClean="0"/>
+              <a:rPr lang="es-ES" dirty="0" err="1"/>
               <a:t>Tecnologia</a:t>
             </a:r>
             <a:r>
-              <a:rPr lang="es-ES" dirty="0" smtClean="0"/>
+              <a:rPr lang="es-ES" dirty="0"/>
               <a:t> </a:t>
             </a:r>
             <a:r>
-              <a:rPr lang="es-ES" dirty="0" err="1" smtClean="0"/>
+              <a:rPr lang="es-ES" dirty="0" err="1"/>
               <a:t>coneguda</a:t>
             </a:r>
             <a:r>
-              <a:rPr lang="es-ES" dirty="0" smtClean="0"/>
+              <a:rPr lang="es-ES" dirty="0"/>
               <a:t> </a:t>
             </a:r>
             <a:r>
-              <a:rPr lang="es-ES" dirty="0" err="1" smtClean="0"/>
+              <a:rPr lang="es-ES" dirty="0" err="1"/>
               <a:t>pels</a:t>
             </a:r>
             <a:r>
-              <a:rPr lang="es-ES" dirty="0" smtClean="0"/>
+              <a:rPr lang="es-ES" dirty="0"/>
               <a:t> </a:t>
             </a:r>
             <a:r>
-              <a:rPr lang="es-ES" dirty="0" err="1" smtClean="0"/>
+              <a:rPr lang="es-ES" dirty="0" err="1"/>
               <a:t>desenvolupadors</a:t>
             </a:r>
-            <a:endParaRPr lang="es-ES" dirty="0" smtClean="0"/>
+            <a:endParaRPr lang="es-ES" dirty="0"/>
           </a:p>
           <a:p>
             <a:pPr marL="285750" indent="-285750">
@@ -6285,15 +6253,15 @@
               <a:buChar char="•"/>
             </a:pPr>
             <a:r>
-              <a:rPr lang="es-ES" dirty="0" err="1" smtClean="0"/>
+              <a:rPr lang="es-ES" dirty="0" err="1"/>
               <a:t>Llenguatge</a:t>
             </a:r>
             <a:r>
-              <a:rPr lang="es-ES" dirty="0" smtClean="0"/>
+              <a:rPr lang="es-ES" dirty="0"/>
               <a:t> </a:t>
             </a:r>
             <a:r>
-              <a:rPr lang="es-ES" dirty="0" err="1" smtClean="0"/>
+              <a:rPr lang="es-ES" dirty="0" err="1"/>
               <a:t>intuïtiu</a:t>
             </a:r>
             <a:endParaRPr lang="es-ES" dirty="0"/>
@@ -6327,14 +6295,14 @@
               <a:buChar char="•"/>
             </a:pPr>
             <a:r>
-              <a:rPr lang="es-ES" dirty="0" smtClean="0"/>
+              <a:rPr lang="es-ES" dirty="0"/>
               <a:t>Base de </a:t>
             </a:r>
             <a:r>
-              <a:rPr lang="es-ES" dirty="0" err="1" smtClean="0"/>
+              <a:rPr lang="es-ES" dirty="0" err="1"/>
               <a:t>dades</a:t>
             </a:r>
-            <a:endParaRPr lang="es-ES" dirty="0" smtClean="0"/>
+            <a:endParaRPr lang="es-ES" dirty="0"/>
           </a:p>
           <a:p>
             <a:pPr marL="285750" indent="-285750">
@@ -6342,30 +6310,29 @@
               <a:buChar char="•"/>
             </a:pPr>
             <a:r>
-              <a:rPr lang="es-ES" dirty="0" err="1" smtClean="0"/>
+              <a:rPr lang="es-ES" dirty="0" err="1"/>
               <a:t>Fàcil</a:t>
             </a:r>
             <a:r>
-              <a:rPr lang="es-ES" dirty="0" smtClean="0"/>
+              <a:rPr lang="es-ES" dirty="0"/>
               <a:t> de crear i administrar (</a:t>
             </a:r>
             <a:r>
-              <a:rPr lang="es-ES" dirty="0" err="1" smtClean="0"/>
+              <a:rPr lang="es-ES" dirty="0" err="1"/>
               <a:t>utilitzant</a:t>
             </a:r>
             <a:r>
-              <a:rPr lang="es-ES" dirty="0" smtClean="0"/>
+              <a:rPr lang="es-ES" dirty="0"/>
               <a:t> </a:t>
             </a:r>
             <a:r>
-              <a:rPr lang="es-ES" dirty="0" err="1" smtClean="0"/>
+              <a:rPr lang="es-ES" dirty="0" err="1"/>
               <a:t>pgAdmin</a:t>
             </a:r>
             <a:r>
-              <a:rPr lang="es-ES" dirty="0" smtClean="0"/>
+              <a:rPr lang="es-ES" dirty="0"/>
               <a:t>)</a:t>
             </a:r>
-            <a:endParaRPr lang="es-ES" dirty="0"/>
           </a:p>
         </p:txBody>
       </p:sp>
@@ -6379,21 +6346,6 @@
   <p:clrMapOvr>
     <a:masterClrMapping/>
   </p:clrMapOvr>
-  <mc:AlternateContent xmlns:mc="http://schemas.openxmlformats.org/markup-compatibility/2006" xmlns:p14="http://schemas.microsoft.com/office/powerpoint/2010/main">
-    <mc:Choice Requires="p14">
-      <p:transition p14:dur="0"/>
-    </mc:Choice>
-    <mc:Fallback xmlns="">
-      <p:transition/>
-    </mc:Fallback>
-  </mc:AlternateContent>
-  <p:timing>
-    <p:tnLst>
-      <p:par>
-        <p:cTn id="1" dur="indefinite" restart="never" nodeType="tmRoot"/>
-      </p:par>
-    </p:tnLst>
-  </p:timing>
 </p:sld>
 </file>
 
@@ -6438,10 +6390,9 @@
           <a:p>
             <a:pPr marL="457200" indent="-457200"/>
             <a:r>
-              <a:rPr lang="ca-ES" sz="2800" dirty="0" smtClean="0"/>
+              <a:rPr lang="ca-ES" sz="2800" dirty="0"/>
               <a:t>Responsabilitats i rols</a:t>
             </a:r>
-            <a:endParaRPr lang="ca-ES" sz="2800" dirty="0"/>
           </a:p>
         </p:txBody>
       </p:sp>
@@ -6496,21 +6447,6 @@
   <p:clrMapOvr>
     <a:masterClrMapping/>
   </p:clrMapOvr>
-  <mc:AlternateContent xmlns:mc="http://schemas.openxmlformats.org/markup-compatibility/2006" xmlns:p14="http://schemas.microsoft.com/office/powerpoint/2010/main">
-    <mc:Choice Requires="p14">
-      <p:transition p14:dur="0"/>
-    </mc:Choice>
-    <mc:Fallback xmlns="">
-      <p:transition/>
-    </mc:Fallback>
-  </mc:AlternateContent>
-  <p:timing>
-    <p:tnLst>
-      <p:par>
-        <p:cTn id="1" dur="indefinite" restart="never" nodeType="tmRoot"/>
-      </p:par>
-    </p:tnLst>
-  </p:timing>
 </p:sld>
 </file>
 
@@ -6630,13 +6566,6 @@
   <p:clrMapOvr>
     <a:masterClrMapping/>
   </p:clrMapOvr>
-  <p:timing>
-    <p:tnLst>
-      <p:par>
-        <p:cTn id="1" dur="indefinite" restart="never" nodeType="tmRoot"/>
-      </p:par>
-    </p:tnLst>
-  </p:timing>
 </p:sld>
 </file>
 
@@ -6680,10 +6609,9 @@
           <a:lstStyle/>
           <a:p>
             <a:r>
-              <a:rPr lang="ca-ES" sz="4000" dirty="0" smtClean="0"/>
+              <a:rPr lang="ca-ES" sz="4000" dirty="0"/>
               <a:t>Durant aquesta presentació...</a:t>
             </a:r>
-            <a:endParaRPr lang="ca-ES" sz="4000" dirty="0"/>
           </a:p>
         </p:txBody>
       </p:sp>
@@ -6708,13 +6636,6 @@
             <a:normAutofit fontScale="92500" lnSpcReduction="10000"/>
           </a:bodyPr>
           <a:lstStyle/>
-          <a:p>
-            <a:pPr marL="342900" lvl="0" indent="-342900">
-              <a:buFont typeface="Arial" pitchFamily="34" charset="0"/>
-              <a:buChar char="•"/>
-            </a:pPr>
-            <a:endParaRPr lang="ca-ES" dirty="0" smtClean="0"/>
-          </a:p>
           <a:p>
             <a:pPr marL="342900" lvl="0" indent="-342900">
               <a:buFont typeface="Arial" pitchFamily="34" charset="0"/>
@@ -6727,7 +6648,7 @@
               <a:buFont typeface="Arial" pitchFamily="34" charset="0"/>
               <a:buChar char="•"/>
             </a:pPr>
-            <a:endParaRPr lang="ca-ES" dirty="0" smtClean="0"/>
+            <a:endParaRPr lang="ca-ES" dirty="0"/>
           </a:p>
           <a:p>
             <a:pPr marL="342900" lvl="0" indent="-342900">
@@ -6741,24 +6662,31 @@
               <a:buFont typeface="Arial" pitchFamily="34" charset="0"/>
               <a:buChar char="•"/>
             </a:pPr>
-            <a:r>
-              <a:rPr lang="ca-ES" sz="3600" b="0" dirty="0" smtClean="0"/>
+            <a:endParaRPr lang="ca-ES" dirty="0"/>
+          </a:p>
+          <a:p>
+            <a:pPr marL="342900" lvl="0" indent="-342900">
+              <a:buFont typeface="Arial" pitchFamily="34" charset="0"/>
+              <a:buChar char="•"/>
+            </a:pPr>
+            <a:r>
+              <a:rPr lang="ca-ES" sz="3600" b="0" dirty="0"/>
               <a:t>Què és </a:t>
             </a:r>
             <a:r>
-              <a:rPr lang="ca-ES" sz="3600" b="0" dirty="0" err="1" smtClean="0"/>
+              <a:rPr lang="ca-ES" sz="3600" b="0" dirty="0" err="1"/>
               <a:t>Taam</a:t>
             </a:r>
             <a:r>
-              <a:rPr lang="ca-ES" sz="3600" b="0" dirty="0" smtClean="0"/>
+              <a:rPr lang="ca-ES" sz="3600" b="0" dirty="0"/>
               <a:t> </a:t>
             </a:r>
             <a:r>
-              <a:rPr lang="ca-ES" sz="3600" b="0" dirty="0" err="1" smtClean="0"/>
+              <a:rPr lang="ca-ES" sz="3600" b="0" dirty="0" err="1"/>
               <a:t>App</a:t>
             </a:r>
             <a:r>
-              <a:rPr lang="ca-ES" sz="3600" b="0" dirty="0" smtClean="0"/>
+              <a:rPr lang="ca-ES" sz="3600" b="0" dirty="0"/>
               <a:t>?</a:t>
             </a:r>
           </a:p>
@@ -6776,11 +6704,7 @@
             </a:pPr>
             <a:r>
               <a:rPr lang="ca-ES" sz="3600" b="0" dirty="0"/>
-              <a:t>Tasques </a:t>
-            </a:r>
-            <a:r>
-              <a:rPr lang="ca-ES" sz="3600" b="0" dirty="0" smtClean="0"/>
-              <a:t>principals.</a:t>
+              <a:t>Tasques principals.</a:t>
             </a:r>
           </a:p>
           <a:p>
@@ -6788,7 +6712,7 @@
               <a:buFont typeface="Arial" pitchFamily="34" charset="0"/>
               <a:buChar char="•"/>
             </a:pPr>
-            <a:endParaRPr lang="ca-ES" sz="3600" b="0" dirty="0" smtClean="0"/>
+            <a:endParaRPr lang="ca-ES" sz="3600" b="0" dirty="0"/>
           </a:p>
           <a:p>
             <a:pPr marL="342900" lvl="0" indent="-342900">
@@ -6804,14 +6728,13 @@
               <a:t> i </a:t>
             </a:r>
             <a:r>
-              <a:rPr lang="es-ES" sz="3600" b="0" dirty="0" err="1" smtClean="0"/>
+              <a:rPr lang="es-ES" sz="3600" b="0" dirty="0" err="1"/>
               <a:t>rols</a:t>
             </a:r>
             <a:r>
-              <a:rPr lang="es-ES" b="0" dirty="0" smtClean="0"/>
+              <a:rPr lang="es-ES" b="0" dirty="0"/>
               <a:t>.</a:t>
             </a:r>
-            <a:endParaRPr lang="es-ES" b="0" dirty="0"/>
           </a:p>
         </p:txBody>
       </p:sp>
@@ -6825,13 +6748,6 @@
   <p:clrMapOvr>
     <a:masterClrMapping/>
   </p:clrMapOvr>
-  <p:timing>
-    <p:tnLst>
-      <p:par>
-        <p:cTn id="1" dur="indefinite" restart="never" nodeType="tmRoot"/>
-      </p:par>
-    </p:tnLst>
-  </p:timing>
 </p:sld>
 </file>
 
@@ -6875,10 +6791,9 @@
           <a:lstStyle/>
           <a:p>
             <a:r>
-              <a:rPr lang="ca-ES" sz="4000" dirty="0" smtClean="0"/>
+              <a:rPr lang="ca-ES" sz="4000" dirty="0"/>
               <a:t>Durant aquesta presentació...</a:t>
             </a:r>
-            <a:endParaRPr lang="ca-ES" sz="4000" dirty="0"/>
           </a:p>
         </p:txBody>
       </p:sp>
@@ -6903,13 +6818,6 @@
             <a:normAutofit fontScale="92500" lnSpcReduction="10000"/>
           </a:bodyPr>
           <a:lstStyle/>
-          <a:p>
-            <a:pPr marL="342900" lvl="0" indent="-342900">
-              <a:buFont typeface="Arial" pitchFamily="34" charset="0"/>
-              <a:buChar char="•"/>
-            </a:pPr>
-            <a:endParaRPr lang="ca-ES" dirty="0" smtClean="0"/>
-          </a:p>
           <a:p>
             <a:pPr marL="342900" lvl="0" indent="-342900">
               <a:buFont typeface="Arial" pitchFamily="34" charset="0"/>
@@ -6922,7 +6830,7 @@
               <a:buFont typeface="Arial" pitchFamily="34" charset="0"/>
               <a:buChar char="•"/>
             </a:pPr>
-            <a:endParaRPr lang="ca-ES" dirty="0" smtClean="0"/>
+            <a:endParaRPr lang="ca-ES" dirty="0"/>
           </a:p>
           <a:p>
             <a:pPr marL="342900" lvl="0" indent="-342900">
@@ -6936,24 +6844,31 @@
               <a:buFont typeface="Arial" pitchFamily="34" charset="0"/>
               <a:buChar char="•"/>
             </a:pPr>
-            <a:r>
-              <a:rPr lang="ca-ES" sz="3600" b="1" dirty="0" smtClean="0"/>
+            <a:endParaRPr lang="ca-ES" dirty="0"/>
+          </a:p>
+          <a:p>
+            <a:pPr marL="342900" lvl="0" indent="-342900">
+              <a:buFont typeface="Arial" pitchFamily="34" charset="0"/>
+              <a:buChar char="•"/>
+            </a:pPr>
+            <a:r>
+              <a:rPr lang="ca-ES" sz="3600" b="1" dirty="0"/>
               <a:t>Què és </a:t>
             </a:r>
             <a:r>
-              <a:rPr lang="ca-ES" sz="3600" b="1" dirty="0" err="1" smtClean="0"/>
+              <a:rPr lang="ca-ES" sz="3600" b="1" dirty="0" err="1"/>
               <a:t>Taam</a:t>
             </a:r>
             <a:r>
-              <a:rPr lang="ca-ES" sz="3600" b="1" dirty="0" smtClean="0"/>
+              <a:rPr lang="ca-ES" sz="3600" b="1" dirty="0"/>
               <a:t> </a:t>
             </a:r>
             <a:r>
-              <a:rPr lang="ca-ES" sz="3600" b="1" dirty="0" err="1" smtClean="0"/>
+              <a:rPr lang="ca-ES" sz="3600" b="1" dirty="0" err="1"/>
               <a:t>App</a:t>
             </a:r>
             <a:r>
-              <a:rPr lang="ca-ES" sz="3600" b="1" dirty="0" smtClean="0"/>
+              <a:rPr lang="ca-ES" sz="3600" b="1" dirty="0"/>
               <a:t>?</a:t>
             </a:r>
           </a:p>
@@ -6971,11 +6886,7 @@
             </a:pPr>
             <a:r>
               <a:rPr lang="ca-ES" sz="3600" b="0" dirty="0"/>
-              <a:t>Tasques </a:t>
-            </a:r>
-            <a:r>
-              <a:rPr lang="ca-ES" sz="3600" b="0" dirty="0" smtClean="0"/>
-              <a:t>principals.</a:t>
+              <a:t>Tasques principals.</a:t>
             </a:r>
           </a:p>
           <a:p>
@@ -6983,7 +6894,7 @@
               <a:buFont typeface="Arial" pitchFamily="34" charset="0"/>
               <a:buChar char="•"/>
             </a:pPr>
-            <a:endParaRPr lang="ca-ES" sz="3600" b="0" dirty="0" smtClean="0"/>
+            <a:endParaRPr lang="ca-ES" sz="3600" b="0" dirty="0"/>
           </a:p>
           <a:p>
             <a:pPr marL="342900" lvl="0" indent="-342900">
@@ -6999,14 +6910,13 @@
               <a:t> i </a:t>
             </a:r>
             <a:r>
-              <a:rPr lang="es-ES" sz="3600" b="0" dirty="0" err="1" smtClean="0"/>
+              <a:rPr lang="es-ES" sz="3600" b="0" dirty="0" err="1"/>
               <a:t>rols</a:t>
             </a:r>
             <a:r>
-              <a:rPr lang="es-ES" b="0" dirty="0" smtClean="0"/>
+              <a:rPr lang="es-ES" b="0" dirty="0"/>
               <a:t>.</a:t>
             </a:r>
-            <a:endParaRPr lang="es-ES" b="0" dirty="0"/>
           </a:p>
         </p:txBody>
       </p:sp>
@@ -7020,13 +6930,6 @@
   <p:clrMapOvr>
     <a:masterClrMapping/>
   </p:clrMapOvr>
-  <p:timing>
-    <p:tnLst>
-      <p:par>
-        <p:cTn id="1" dur="indefinite" restart="never" nodeType="tmRoot"/>
-      </p:par>
-    </p:tnLst>
-  </p:timing>
 </p:sld>
 </file>
 
@@ -7154,29 +7057,19 @@
               <a:rPr lang="es-ES" b="1" dirty="0"/>
               <a:t>INGREDIENTES: </a:t>
             </a:r>
-            <a:endParaRPr lang="es-ES" b="1" dirty="0" smtClean="0"/>
           </a:p>
           <a:p>
             <a:pPr algn="just"/>
             <a:r>
-              <a:rPr lang="es-ES" dirty="0" smtClean="0"/>
-              <a:t>Patatas deshidratadas</a:t>
-            </a:r>
-            <a:r>
               <a:rPr lang="es-ES" dirty="0"/>
-              <a:t>, aceites </a:t>
-            </a:r>
-            <a:endParaRPr lang="es-ES" dirty="0" smtClean="0"/>
+              <a:t>Patatas deshidratadas, aceites </a:t>
+            </a:r>
           </a:p>
           <a:p>
             <a:pPr algn="just"/>
             <a:r>
-              <a:rPr lang="es-ES" dirty="0" smtClean="0"/>
-              <a:t>vegetales </a:t>
-            </a:r>
-            <a:r>
               <a:rPr lang="es-ES" dirty="0"/>
-              <a:t>(girasol, palma, maíz) en proporción variable, harina de trigo, harina de maíz, harina de arroz, </a:t>
+              <a:t>vegetales (girasol, palma, maíz) en proporción variable, harina de trigo, harina de maíz, harina de arroz, </a:t>
             </a:r>
             <a:r>
               <a:rPr lang="es-ES" dirty="0" err="1"/>
@@ -7215,13 +7108,6 @@
   <p:clrMapOvr>
     <a:masterClrMapping/>
   </p:clrMapOvr>
-  <p:timing>
-    <p:tnLst>
-      <p:par>
-        <p:cTn id="1" dur="indefinite" restart="never" nodeType="tmRoot"/>
-      </p:par>
-    </p:tnLst>
-  </p:timing>
 </p:sld>
 </file>
 
@@ -7358,13 +7244,6 @@
   <p:clrMapOvr>
     <a:masterClrMapping/>
   </p:clrMapOvr>
-  <p:timing>
-    <p:tnLst>
-      <p:par>
-        <p:cTn id="1" dur="indefinite" restart="never" nodeType="tmRoot"/>
-      </p:par>
-    </p:tnLst>
-  </p:timing>
 </p:sld>
 </file>
 
@@ -7412,7 +7291,6 @@
               <a:rPr lang="es-ES" sz="4000" dirty="0"/>
               <a:t>MOTIVACIÓ I OBJECTIU</a:t>
             </a:r>
-            <a:endParaRPr lang="es-ES" sz="4000" dirty="0"/>
           </a:p>
         </p:txBody>
       </p:sp>
@@ -7479,27 +7357,27 @@
               <a:t> </a:t>
             </a:r>
             <a:r>
-              <a:rPr lang="fr-FR" sz="2800" dirty="0" err="1" smtClean="0"/>
+              <a:rPr lang="fr-FR" sz="2800" dirty="0" err="1"/>
               <a:t>ingredients</a:t>
             </a:r>
             <a:r>
-              <a:rPr lang="fr-FR" sz="2800" dirty="0" smtClean="0"/>
+              <a:rPr lang="fr-FR" sz="2800" dirty="0"/>
               <a:t> a l’</a:t>
             </a:r>
             <a:r>
-              <a:rPr lang="fr-FR" sz="2800" dirty="0" err="1" smtClean="0"/>
+              <a:rPr lang="fr-FR" sz="2800" dirty="0" err="1"/>
               <a:t>hora</a:t>
             </a:r>
             <a:r>
-              <a:rPr lang="fr-FR" sz="2800" dirty="0" smtClean="0"/>
+              <a:rPr lang="fr-FR" sz="2800" dirty="0"/>
               <a:t> de </a:t>
             </a:r>
             <a:r>
-              <a:rPr lang="fr-FR" sz="2800" dirty="0" err="1" smtClean="0"/>
+              <a:rPr lang="fr-FR" sz="2800" dirty="0" err="1"/>
               <a:t>comprar</a:t>
             </a:r>
             <a:r>
-              <a:rPr lang="fr-FR" sz="2800" dirty="0" smtClean="0"/>
+              <a:rPr lang="fr-FR" sz="2800" dirty="0"/>
               <a:t>.</a:t>
             </a:r>
             <a:endParaRPr lang="es-ES" sz="2800" dirty="0"/>
@@ -7545,40 +7423,36 @@
               <a:t> </a:t>
             </a:r>
             <a:r>
-              <a:rPr lang="es-ES" sz="2800" b="1" dirty="0" err="1" smtClean="0"/>
+              <a:rPr lang="es-ES" sz="2800" b="1" dirty="0" err="1"/>
               <a:t>agilitzar</a:t>
             </a:r>
             <a:r>
-              <a:rPr lang="es-ES" sz="2800" dirty="0" smtClean="0"/>
+              <a:rPr lang="es-ES" sz="2800" dirty="0"/>
               <a:t> el </a:t>
             </a:r>
             <a:r>
-              <a:rPr lang="es-ES" sz="2800" dirty="0" err="1" smtClean="0"/>
+              <a:rPr lang="es-ES" sz="2800" dirty="0" err="1"/>
               <a:t>proces</a:t>
             </a:r>
             <a:r>
-              <a:rPr lang="es-ES" sz="2800" dirty="0" smtClean="0"/>
+              <a:rPr lang="es-ES" sz="2800" dirty="0"/>
               <a:t> de comprar </a:t>
             </a:r>
             <a:r>
-              <a:rPr lang="es-ES" sz="2800" dirty="0" err="1" smtClean="0"/>
+              <a:rPr lang="es-ES" sz="2800" dirty="0" err="1"/>
               <a:t>amb</a:t>
             </a:r>
             <a:r>
-              <a:rPr lang="es-ES" sz="2800" dirty="0" smtClean="0"/>
+              <a:rPr lang="es-ES" sz="2800" dirty="0"/>
               <a:t> </a:t>
             </a:r>
             <a:r>
-              <a:rPr lang="es-ES" sz="2800" dirty="0" err="1" smtClean="0"/>
+              <a:rPr lang="es-ES" sz="2800" dirty="0" err="1"/>
               <a:t>Taam</a:t>
             </a:r>
             <a:r>
-              <a:rPr lang="es-ES" sz="2800" dirty="0" smtClean="0"/>
-              <a:t> </a:t>
-            </a:r>
-            <a:r>
               <a:rPr lang="es-ES" sz="2800" dirty="0"/>
-              <a:t>App.</a:t>
+              <a:t> App.</a:t>
             </a:r>
           </a:p>
         </p:txBody>
@@ -7657,13 +7531,6 @@
   <p:clrMapOvr>
     <a:masterClrMapping/>
   </p:clrMapOvr>
-  <p:timing>
-    <p:tnLst>
-      <p:par>
-        <p:cTn id="1" dur="indefinite" restart="never" nodeType="tmRoot"/>
-      </p:par>
-    </p:tnLst>
-  </p:timing>
 </p:sld>
 </file>
 
@@ -7707,10 +7574,9 @@
           <a:lstStyle/>
           <a:p>
             <a:r>
-              <a:rPr lang="ca-ES" sz="4000" dirty="0" smtClean="0"/>
+              <a:rPr lang="ca-ES" sz="4000" dirty="0"/>
               <a:t>Durant aquesta presentació...</a:t>
             </a:r>
-            <a:endParaRPr lang="ca-ES" sz="4000" dirty="0"/>
           </a:p>
         </p:txBody>
       </p:sp>
@@ -7735,13 +7601,6 @@
             <a:normAutofit fontScale="92500" lnSpcReduction="10000"/>
           </a:bodyPr>
           <a:lstStyle/>
-          <a:p>
-            <a:pPr marL="342900" lvl="0" indent="-342900">
-              <a:buFont typeface="Arial" pitchFamily="34" charset="0"/>
-              <a:buChar char="•"/>
-            </a:pPr>
-            <a:endParaRPr lang="ca-ES" dirty="0" smtClean="0"/>
-          </a:p>
           <a:p>
             <a:pPr marL="342900" lvl="0" indent="-342900">
               <a:buFont typeface="Arial" pitchFamily="34" charset="0"/>
@@ -7754,7 +7613,7 @@
               <a:buFont typeface="Arial" pitchFamily="34" charset="0"/>
               <a:buChar char="•"/>
             </a:pPr>
-            <a:endParaRPr lang="ca-ES" dirty="0" smtClean="0"/>
+            <a:endParaRPr lang="ca-ES" dirty="0"/>
           </a:p>
           <a:p>
             <a:pPr marL="342900" lvl="0" indent="-342900">
@@ -7768,24 +7627,31 @@
               <a:buFont typeface="Arial" pitchFamily="34" charset="0"/>
               <a:buChar char="•"/>
             </a:pPr>
-            <a:r>
-              <a:rPr lang="ca-ES" sz="3600" b="0" dirty="0" smtClean="0"/>
+            <a:endParaRPr lang="ca-ES" dirty="0"/>
+          </a:p>
+          <a:p>
+            <a:pPr marL="342900" lvl="0" indent="-342900">
+              <a:buFont typeface="Arial" pitchFamily="34" charset="0"/>
+              <a:buChar char="•"/>
+            </a:pPr>
+            <a:r>
+              <a:rPr lang="ca-ES" sz="3600" b="0" dirty="0"/>
               <a:t>Què és </a:t>
             </a:r>
             <a:r>
-              <a:rPr lang="ca-ES" sz="3600" b="0" dirty="0" err="1" smtClean="0"/>
+              <a:rPr lang="ca-ES" sz="3600" b="0" dirty="0" err="1"/>
               <a:t>Taam</a:t>
             </a:r>
             <a:r>
-              <a:rPr lang="ca-ES" sz="3600" b="0" dirty="0" smtClean="0"/>
+              <a:rPr lang="ca-ES" sz="3600" b="0" dirty="0"/>
               <a:t> </a:t>
             </a:r>
             <a:r>
-              <a:rPr lang="ca-ES" sz="3600" b="0" dirty="0" err="1" smtClean="0"/>
+              <a:rPr lang="ca-ES" sz="3600" b="0" dirty="0" err="1"/>
               <a:t>App</a:t>
             </a:r>
             <a:r>
-              <a:rPr lang="ca-ES" sz="3600" b="0" dirty="0" smtClean="0"/>
+              <a:rPr lang="ca-ES" sz="3600" b="0" dirty="0"/>
               <a:t>?</a:t>
             </a:r>
           </a:p>
@@ -7803,11 +7669,7 @@
             </a:pPr>
             <a:r>
               <a:rPr lang="ca-ES" sz="3600" b="1" dirty="0"/>
-              <a:t>Tasques </a:t>
-            </a:r>
-            <a:r>
-              <a:rPr lang="ca-ES" sz="3600" b="1" dirty="0" smtClean="0"/>
-              <a:t>principals.</a:t>
+              <a:t>Tasques principals.</a:t>
             </a:r>
           </a:p>
           <a:p>
@@ -7815,7 +7677,7 @@
               <a:buFont typeface="Arial" pitchFamily="34" charset="0"/>
               <a:buChar char="•"/>
             </a:pPr>
-            <a:endParaRPr lang="ca-ES" sz="3600" b="0" dirty="0" smtClean="0"/>
+            <a:endParaRPr lang="ca-ES" sz="3600" b="0" dirty="0"/>
           </a:p>
           <a:p>
             <a:pPr marL="342900" lvl="0" indent="-342900">
@@ -7823,15 +7685,15 @@
               <a:buChar char="•"/>
             </a:pPr>
             <a:r>
-              <a:rPr lang="es-ES" sz="3600" b="0" dirty="0" err="1" smtClean="0"/>
+              <a:rPr lang="es-ES" sz="3600" b="0" dirty="0" err="1"/>
               <a:t>Organització</a:t>
             </a:r>
             <a:r>
-              <a:rPr lang="es-ES" sz="3600" b="0" dirty="0" smtClean="0"/>
+              <a:rPr lang="es-ES" sz="3600" b="0" dirty="0"/>
               <a:t> i </a:t>
             </a:r>
             <a:r>
-              <a:rPr lang="es-ES" sz="3600" b="0" dirty="0" err="1" smtClean="0"/>
+              <a:rPr lang="es-ES" sz="3600" b="0" dirty="0" err="1"/>
               <a:t>tecnologies</a:t>
             </a:r>
             <a:endParaRPr lang="es-ES" b="0" dirty="0"/>
@@ -7848,13 +7710,6 @@
   <p:clrMapOvr>
     <a:masterClrMapping/>
   </p:clrMapOvr>
-  <p:timing>
-    <p:tnLst>
-      <p:par>
-        <p:cTn id="1" dur="indefinite" restart="never" nodeType="tmRoot"/>
-      </p:par>
-    </p:tnLst>
-  </p:timing>
 </p:sld>
 </file>
 
@@ -7931,14 +7786,14 @@
               <a:buFont typeface="+mj-lt"/>
               <a:buAutoNum type="arabicPeriod"/>
             </a:pPr>
-            <a:endParaRPr lang="ca-ES" dirty="0" smtClean="0"/>
+            <a:endParaRPr lang="ca-ES" dirty="0"/>
           </a:p>
           <a:p>
             <a:pPr marL="457200" indent="-457200">
               <a:buFont typeface="+mj-lt"/>
               <a:buAutoNum type="arabicPeriod"/>
             </a:pPr>
-            <a:endParaRPr lang="ca-ES" dirty="0" smtClean="0"/>
+            <a:endParaRPr lang="ca-ES" dirty="0"/>
           </a:p>
           <a:p>
             <a:endParaRPr lang="ca-ES" dirty="0"/>
@@ -7993,7 +7848,7 @@
           <a:p>
             <a:pPr algn="ctr"/>
             <a:r>
-              <a:rPr lang="es-ES" dirty="0" smtClean="0">
+              <a:rPr lang="es-ES" dirty="0">
                 <a:solidFill>
                   <a:schemeClr val="tx1"/>
                 </a:solidFill>
@@ -8001,7 +7856,7 @@
               <a:t>Fase </a:t>
             </a:r>
             <a:r>
-              <a:rPr lang="es-ES" dirty="0" err="1" smtClean="0">
+              <a:rPr lang="es-ES" dirty="0" err="1">
                 <a:solidFill>
                   <a:schemeClr val="tx1"/>
                 </a:solidFill>
@@ -8064,18 +7919,13 @@
           <a:p>
             <a:pPr algn="ctr"/>
             <a:r>
-              <a:rPr lang="es-ES" dirty="0" smtClean="0">
+              <a:rPr lang="es-ES" dirty="0">
                 <a:solidFill>
                   <a:schemeClr val="tx1"/>
                 </a:solidFill>
               </a:rPr>
               <a:t>Fase final</a:t>
             </a:r>
-            <a:endParaRPr lang="es-ES" dirty="0">
-              <a:solidFill>
-                <a:schemeClr val="tx1"/>
-              </a:solidFill>
-            </a:endParaRPr>
           </a:p>
         </p:txBody>
       </p:sp>
@@ -8127,7 +7977,7 @@
           <a:p>
             <a:pPr algn="ctr"/>
             <a:r>
-              <a:rPr lang="es-ES" dirty="0" smtClean="0">
+              <a:rPr lang="es-ES" dirty="0">
                 <a:solidFill>
                   <a:schemeClr val="tx1"/>
                 </a:solidFill>
@@ -8135,7 +7985,7 @@
               <a:t>Fase </a:t>
             </a:r>
             <a:r>
-              <a:rPr lang="es-ES" dirty="0" err="1" smtClean="0">
+              <a:rPr lang="es-ES" dirty="0" err="1">
                 <a:solidFill>
                   <a:schemeClr val="tx1"/>
                 </a:solidFill>
@@ -8160,13 +8010,6 @@
   <p:clrMapOvr>
     <a:masterClrMapping/>
   </p:clrMapOvr>
-  <p:timing>
-    <p:tnLst>
-      <p:par>
-        <p:cTn id="1" dur="indefinite" restart="never" nodeType="tmRoot"/>
-      </p:par>
-    </p:tnLst>
-  </p:timing>
 </p:sld>
 </file>
 
@@ -8211,10 +8054,9 @@
           <a:p>
             <a:pPr marL="342900" lvl="0" indent="-342900"/>
             <a:r>
-              <a:rPr lang="ca-ES" sz="4000" dirty="0" smtClean="0"/>
+              <a:rPr lang="ca-ES" sz="4000" dirty="0"/>
               <a:t>Fase inicial</a:t>
             </a:r>
-            <a:endParaRPr lang="ca-ES" sz="4000" dirty="0"/>
           </a:p>
         </p:txBody>
       </p:sp>
@@ -8244,14 +8086,14 @@
               <a:buFont typeface="+mj-lt"/>
               <a:buAutoNum type="arabicPeriod"/>
             </a:pPr>
-            <a:endParaRPr lang="ca-ES" dirty="0" smtClean="0"/>
+            <a:endParaRPr lang="ca-ES" dirty="0"/>
           </a:p>
           <a:p>
             <a:pPr marL="457200" indent="-457200">
               <a:buFont typeface="+mj-lt"/>
               <a:buAutoNum type="arabicPeriod"/>
             </a:pPr>
-            <a:endParaRPr lang="ca-ES" dirty="0" smtClean="0"/>
+            <a:endParaRPr lang="ca-ES" dirty="0"/>
           </a:p>
           <a:p>
             <a:endParaRPr lang="ca-ES" dirty="0"/>
@@ -8285,33 +8127,33 @@
               <a:buChar char="•"/>
             </a:pPr>
             <a:r>
-              <a:rPr lang="es-ES" dirty="0" err="1" smtClean="0"/>
+              <a:rPr lang="es-ES" dirty="0" err="1"/>
               <a:t>Requisits</a:t>
             </a:r>
             <a:r>
-              <a:rPr lang="es-ES" dirty="0" smtClean="0"/>
+              <a:rPr lang="es-ES" dirty="0"/>
               <a:t> </a:t>
             </a:r>
             <a:r>
-              <a:rPr lang="es-ES" dirty="0" err="1" smtClean="0"/>
+              <a:rPr lang="es-ES" dirty="0" err="1"/>
               <a:t>funcionals</a:t>
             </a:r>
             <a:r>
-              <a:rPr lang="es-ES" dirty="0" smtClean="0"/>
+              <a:rPr lang="es-ES" dirty="0"/>
               <a:t> i no </a:t>
             </a:r>
             <a:r>
-              <a:rPr lang="es-ES" dirty="0" err="1" smtClean="0"/>
+              <a:rPr lang="es-ES" dirty="0" err="1"/>
               <a:t>funcionals</a:t>
             </a:r>
-            <a:endParaRPr lang="es-ES" dirty="0" smtClean="0"/>
+            <a:endParaRPr lang="es-ES" dirty="0"/>
           </a:p>
           <a:p>
             <a:pPr marL="285750" indent="-285750">
               <a:buFont typeface="Arial" panose="020B0604020202020204" pitchFamily="34" charset="0"/>
               <a:buChar char="•"/>
             </a:pPr>
-            <a:endParaRPr lang="es-ES" dirty="0" smtClean="0"/>
+            <a:endParaRPr lang="es-ES" dirty="0"/>
           </a:p>
           <a:p>
             <a:pPr marL="285750" indent="-285750">
@@ -8319,33 +8161,33 @@
               <a:buChar char="•"/>
             </a:pPr>
             <a:r>
-              <a:rPr lang="es-ES" dirty="0" err="1" smtClean="0"/>
+              <a:rPr lang="es-ES" dirty="0" err="1"/>
               <a:t>Prototip</a:t>
             </a:r>
             <a:r>
-              <a:rPr lang="es-ES" dirty="0" smtClean="0"/>
+              <a:rPr lang="es-ES" dirty="0"/>
               <a:t> de </a:t>
             </a:r>
             <a:r>
-              <a:rPr lang="es-ES" dirty="0" err="1" smtClean="0"/>
+              <a:rPr lang="es-ES" dirty="0" err="1"/>
               <a:t>baix</a:t>
             </a:r>
             <a:r>
-              <a:rPr lang="es-ES" dirty="0" smtClean="0"/>
+              <a:rPr lang="es-ES" dirty="0"/>
               <a:t> </a:t>
             </a:r>
             <a:r>
-              <a:rPr lang="es-ES" dirty="0" err="1" smtClean="0"/>
+              <a:rPr lang="es-ES" dirty="0" err="1"/>
               <a:t>nivell</a:t>
             </a:r>
-            <a:endParaRPr lang="es-ES" dirty="0" smtClean="0"/>
+            <a:endParaRPr lang="es-ES" dirty="0"/>
           </a:p>
           <a:p>
             <a:pPr marL="285750" indent="-285750">
               <a:buFont typeface="Arial" panose="020B0604020202020204" pitchFamily="34" charset="0"/>
               <a:buChar char="•"/>
             </a:pPr>
-            <a:endParaRPr lang="es-ES" dirty="0" smtClean="0"/>
+            <a:endParaRPr lang="es-ES" dirty="0"/>
           </a:p>
           <a:p>
             <a:pPr marL="285750" indent="-285750">
@@ -8353,27 +8195,27 @@
               <a:buChar char="•"/>
             </a:pPr>
             <a:r>
-              <a:rPr lang="es-ES" dirty="0" err="1" smtClean="0"/>
+              <a:rPr lang="es-ES" dirty="0" err="1"/>
               <a:t>Disseny</a:t>
             </a:r>
             <a:r>
-              <a:rPr lang="es-ES" dirty="0" smtClean="0"/>
+              <a:rPr lang="es-ES" dirty="0"/>
               <a:t> de diagrames (</a:t>
             </a:r>
             <a:r>
-              <a:rPr lang="es-ES" dirty="0" err="1" smtClean="0"/>
+              <a:rPr lang="es-ES" dirty="0" err="1"/>
               <a:t>classes</a:t>
             </a:r>
             <a:r>
-              <a:rPr lang="es-ES" dirty="0" smtClean="0"/>
+              <a:rPr lang="es-ES" dirty="0"/>
               <a:t>, </a:t>
             </a:r>
             <a:r>
-              <a:rPr lang="es-ES" dirty="0" err="1" smtClean="0"/>
+              <a:rPr lang="es-ES" dirty="0" err="1"/>
               <a:t>entitat-relació</a:t>
             </a:r>
             <a:r>
-              <a:rPr lang="es-ES" dirty="0" smtClean="0"/>
+              <a:rPr lang="es-ES" dirty="0"/>
               <a:t>…)</a:t>
             </a:r>
           </a:p>
@@ -8382,7 +8224,7 @@
               <a:buFont typeface="Arial" panose="020B0604020202020204" pitchFamily="34" charset="0"/>
               <a:buChar char="•"/>
             </a:pPr>
-            <a:endParaRPr lang="es-ES" dirty="0" smtClean="0"/>
+            <a:endParaRPr lang="es-ES" dirty="0"/>
           </a:p>
           <a:p>
             <a:pPr marL="285750" indent="-285750">
@@ -8390,27 +8232,27 @@
               <a:buChar char="•"/>
             </a:pPr>
             <a:r>
-              <a:rPr lang="es-ES" dirty="0" err="1" smtClean="0"/>
+              <a:rPr lang="es-ES" dirty="0" err="1"/>
               <a:t>Escollir</a:t>
             </a:r>
             <a:r>
-              <a:rPr lang="es-ES" dirty="0" smtClean="0"/>
+              <a:rPr lang="es-ES" dirty="0"/>
               <a:t> les </a:t>
             </a:r>
             <a:r>
-              <a:rPr lang="es-ES" dirty="0" err="1" smtClean="0"/>
+              <a:rPr lang="es-ES" dirty="0" err="1"/>
               <a:t>eines</a:t>
             </a:r>
             <a:r>
-              <a:rPr lang="es-ES" dirty="0" smtClean="0"/>
+              <a:rPr lang="es-ES" dirty="0"/>
               <a:t> de </a:t>
             </a:r>
             <a:r>
-              <a:rPr lang="es-ES" dirty="0" err="1" smtClean="0"/>
+              <a:rPr lang="es-ES" dirty="0" err="1"/>
               <a:t>desenvolupament</a:t>
             </a:r>
             <a:r>
-              <a:rPr lang="es-ES" dirty="0" smtClean="0"/>
+              <a:rPr lang="es-ES" dirty="0"/>
               <a:t> </a:t>
             </a:r>
           </a:p>
@@ -8419,7 +8261,7 @@
               <a:buFont typeface="Arial" panose="020B0604020202020204" pitchFamily="34" charset="0"/>
               <a:buChar char="•"/>
             </a:pPr>
-            <a:endParaRPr lang="es-ES" dirty="0" smtClean="0"/>
+            <a:endParaRPr lang="es-ES" dirty="0"/>
           </a:p>
           <a:p>
             <a:pPr marL="285750" indent="-285750">
@@ -8427,12 +8269,12 @@
               <a:buChar char="•"/>
             </a:pPr>
             <a:r>
-              <a:rPr lang="es-ES" dirty="0" smtClean="0"/>
+              <a:rPr lang="es-ES" dirty="0"/>
               <a:t>Redactar el contracte</a:t>
             </a:r>
           </a:p>
           <a:p>
-            <a:endParaRPr lang="es-ES" dirty="0" smtClean="0"/>
+            <a:endParaRPr lang="es-ES" dirty="0"/>
           </a:p>
           <a:p>
             <a:pPr marL="285750" indent="-285750">
@@ -8494,13 +8336,6 @@
   <p:clrMapOvr>
     <a:masterClrMapping/>
   </p:clrMapOvr>
-  <p:timing>
-    <p:tnLst>
-      <p:par>
-        <p:cTn id="1" dur="indefinite" restart="never" nodeType="tmRoot"/>
-      </p:par>
-    </p:tnLst>
-  </p:timing>
 </p:sld>
 </file>
 

</xml_diff>